<commit_message>
moving image sources to proper folder
Many of these files were mistakenly in the top-level folder.
Uploaded latest versions to image Sources folder.
</commit_message>
<xml_diff>
--- a/Sources/roadmap.pptx
+++ b/Sources/roadmap.pptx
@@ -3460,53 +3460,6 @@
           </a:fontRef>
         </p:style>
       </p:cxnSp>
-      <p:sp>
-        <p:nvSpPr>
-          <p:cNvPr id="7" name="TextBox 6">
-            <a:extLst>
-              <a:ext uri="{FF2B5EF4-FFF2-40B4-BE49-F238E27FC236}">
-                <a16:creationId xmlns:a16="http://schemas.microsoft.com/office/drawing/2014/main" id="{F4BF4126-7ACE-4051-A7CF-3E9C8DF5A0A2}"/>
-              </a:ext>
-            </a:extLst>
-          </p:cNvPr>
-          <p:cNvSpPr txBox="1"/>
-          <p:nvPr/>
-        </p:nvSpPr>
-        <p:spPr>
-          <a:xfrm>
-            <a:off x="2797128" y="872674"/>
-            <a:ext cx="1089126" cy="400110"/>
-          </a:xfrm>
-          <a:prstGeom prst="rect">
-            <a:avLst/>
-          </a:prstGeom>
-          <a:solidFill>
-            <a:schemeClr val="bg1">
-              <a:lumMod val="65000"/>
-            </a:schemeClr>
-          </a:solidFill>
-          <a:ln>
-            <a:noFill/>
-          </a:ln>
-        </p:spPr>
-        <p:txBody>
-          <a:bodyPr wrap="square" rtlCol="0">
-            <a:spAutoFit/>
-          </a:bodyPr>
-          <a:lstStyle/>
-          <a:p>
-            <a:pPr algn="ctr"/>
-            <a:r>
-              <a:rPr lang="en-US" sz="2000" i="1">
-                <a:solidFill>
-                  <a:schemeClr val="bg1"/>
-                </a:solidFill>
-              </a:rPr>
-              <a:t>Logic</a:t>
-            </a:r>
-          </a:p>
-        </p:txBody>
-      </p:sp>
       <p:grpSp>
         <p:nvGrpSpPr>
           <p:cNvPr id="33" name="Group 32">
@@ -5157,6 +5110,53 @@
           </a:p>
         </p:txBody>
       </p:sp>
+      <p:sp>
+        <p:nvSpPr>
+          <p:cNvPr id="7" name="TextBox 6">
+            <a:extLst>
+              <a:ext uri="{FF2B5EF4-FFF2-40B4-BE49-F238E27FC236}">
+                <a16:creationId xmlns:a16="http://schemas.microsoft.com/office/drawing/2014/main" id="{F4BF4126-7ACE-4051-A7CF-3E9C8DF5A0A2}"/>
+              </a:ext>
+            </a:extLst>
+          </p:cNvPr>
+          <p:cNvSpPr txBox="1"/>
+          <p:nvPr/>
+        </p:nvSpPr>
+        <p:spPr>
+          <a:xfrm>
+            <a:off x="2741003" y="865506"/>
+            <a:ext cx="1229097" cy="707886"/>
+          </a:xfrm>
+          <a:prstGeom prst="rect">
+            <a:avLst/>
+          </a:prstGeom>
+          <a:solidFill>
+            <a:schemeClr val="bg1">
+              <a:lumMod val="65000"/>
+            </a:schemeClr>
+          </a:solidFill>
+          <a:ln>
+            <a:noFill/>
+          </a:ln>
+        </p:spPr>
+        <p:txBody>
+          <a:bodyPr wrap="square" rtlCol="0">
+            <a:spAutoFit/>
+          </a:bodyPr>
+          <a:lstStyle/>
+          <a:p>
+            <a:pPr algn="ctr"/>
+            <a:r>
+              <a:rPr lang="en-US" sz="2000" i="1">
+                <a:solidFill>
+                  <a:schemeClr val="bg1"/>
+                </a:solidFill>
+              </a:rPr>
+              <a:t>Equations &amp;  Logic</a:t>
+            </a:r>
+          </a:p>
+        </p:txBody>
+      </p:sp>
     </p:spTree>
     <p:extLst>
       <p:ext uri="{BB962C8B-B14F-4D97-AF65-F5344CB8AC3E}">

</xml_diff>

<commit_message>
widened image to increase separation
applications chart was too close to equations/logic part
</commit_message>
<xml_diff>
--- a/Sources/roadmap.pptx
+++ b/Sources/roadmap.pptx
@@ -263,7 +263,7 @@
           <a:p>
             <a:fld id="{8B04710D-610E-4965-997E-D54D01F7EB83}" type="datetimeFigureOut">
               <a:rPr lang="en-US" smtClean="0"/>
-              <a:t>11/25/2017</a:t>
+              <a:t>12/2/2017</a:t>
             </a:fld>
             <a:endParaRPr lang="en-US"/>
           </a:p>
@@ -461,7 +461,7 @@
           <a:p>
             <a:fld id="{8B04710D-610E-4965-997E-D54D01F7EB83}" type="datetimeFigureOut">
               <a:rPr lang="en-US" smtClean="0"/>
-              <a:t>11/25/2017</a:t>
+              <a:t>12/2/2017</a:t>
             </a:fld>
             <a:endParaRPr lang="en-US"/>
           </a:p>
@@ -669,7 +669,7 @@
           <a:p>
             <a:fld id="{8B04710D-610E-4965-997E-D54D01F7EB83}" type="datetimeFigureOut">
               <a:rPr lang="en-US" smtClean="0"/>
-              <a:t>11/25/2017</a:t>
+              <a:t>12/2/2017</a:t>
             </a:fld>
             <a:endParaRPr lang="en-US"/>
           </a:p>
@@ -867,7 +867,7 @@
           <a:p>
             <a:fld id="{8B04710D-610E-4965-997E-D54D01F7EB83}" type="datetimeFigureOut">
               <a:rPr lang="en-US" smtClean="0"/>
-              <a:t>11/25/2017</a:t>
+              <a:t>12/2/2017</a:t>
             </a:fld>
             <a:endParaRPr lang="en-US"/>
           </a:p>
@@ -1142,7 +1142,7 @@
           <a:p>
             <a:fld id="{8B04710D-610E-4965-997E-D54D01F7EB83}" type="datetimeFigureOut">
               <a:rPr lang="en-US" smtClean="0"/>
-              <a:t>11/25/2017</a:t>
+              <a:t>12/2/2017</a:t>
             </a:fld>
             <a:endParaRPr lang="en-US"/>
           </a:p>
@@ -1407,7 +1407,7 @@
           <a:p>
             <a:fld id="{8B04710D-610E-4965-997E-D54D01F7EB83}" type="datetimeFigureOut">
               <a:rPr lang="en-US" smtClean="0"/>
-              <a:t>11/25/2017</a:t>
+              <a:t>12/2/2017</a:t>
             </a:fld>
             <a:endParaRPr lang="en-US"/>
           </a:p>
@@ -1819,7 +1819,7 @@
           <a:p>
             <a:fld id="{8B04710D-610E-4965-997E-D54D01F7EB83}" type="datetimeFigureOut">
               <a:rPr lang="en-US" smtClean="0"/>
-              <a:t>11/25/2017</a:t>
+              <a:t>12/2/2017</a:t>
             </a:fld>
             <a:endParaRPr lang="en-US"/>
           </a:p>
@@ -1960,7 +1960,7 @@
           <a:p>
             <a:fld id="{8B04710D-610E-4965-997E-D54D01F7EB83}" type="datetimeFigureOut">
               <a:rPr lang="en-US" smtClean="0"/>
-              <a:t>11/25/2017</a:t>
+              <a:t>12/2/2017</a:t>
             </a:fld>
             <a:endParaRPr lang="en-US"/>
           </a:p>
@@ -2073,7 +2073,7 @@
           <a:p>
             <a:fld id="{8B04710D-610E-4965-997E-D54D01F7EB83}" type="datetimeFigureOut">
               <a:rPr lang="en-US" smtClean="0"/>
-              <a:t>11/25/2017</a:t>
+              <a:t>12/2/2017</a:t>
             </a:fld>
             <a:endParaRPr lang="en-US"/>
           </a:p>
@@ -2384,7 +2384,7 @@
           <a:p>
             <a:fld id="{8B04710D-610E-4965-997E-D54D01F7EB83}" type="datetimeFigureOut">
               <a:rPr lang="en-US" smtClean="0"/>
-              <a:t>11/25/2017</a:t>
+              <a:t>12/2/2017</a:t>
             </a:fld>
             <a:endParaRPr lang="en-US"/>
           </a:p>
@@ -2672,7 +2672,7 @@
           <a:p>
             <a:fld id="{8B04710D-610E-4965-997E-D54D01F7EB83}" type="datetimeFigureOut">
               <a:rPr lang="en-US" smtClean="0"/>
-              <a:t>11/25/2017</a:t>
+              <a:t>12/2/2017</a:t>
             </a:fld>
             <a:endParaRPr lang="en-US"/>
           </a:p>
@@ -2913,7 +2913,7 @@
           <a:p>
             <a:fld id="{8B04710D-610E-4965-997E-D54D01F7EB83}" type="datetimeFigureOut">
               <a:rPr lang="en-US" smtClean="0"/>
-              <a:t>11/25/2017</a:t>
+              <a:t>12/2/2017</a:t>
             </a:fld>
             <a:endParaRPr lang="en-US"/>
           </a:p>
@@ -3346,7 +3346,7 @@
         </p:nvCxnSpPr>
         <p:spPr>
           <a:xfrm>
-            <a:off x="5248297" y="4173135"/>
+            <a:off x="6147457" y="4173135"/>
             <a:ext cx="896756" cy="380043"/>
           </a:xfrm>
           <a:prstGeom prst="bentConnector2">
@@ -3390,7 +3390,7 @@
         </p:nvCxnSpPr>
         <p:spPr>
           <a:xfrm>
-            <a:off x="4256861" y="1568408"/>
+            <a:off x="5156021" y="1568408"/>
             <a:ext cx="1972474" cy="887750"/>
           </a:xfrm>
           <a:prstGeom prst="bentConnector2">
@@ -3433,7 +3433,7 @@
         </p:nvCxnSpPr>
         <p:spPr>
           <a:xfrm>
-            <a:off x="5255104" y="4181538"/>
+            <a:off x="6154264" y="4181538"/>
             <a:ext cx="6058" cy="1053874"/>
           </a:xfrm>
           <a:prstGeom prst="line">
@@ -3882,7 +3882,7 @@
         </p:nvCxnSpPr>
         <p:spPr>
           <a:xfrm flipH="1">
-            <a:off x="4241064" y="774404"/>
+            <a:off x="5140224" y="774404"/>
             <a:ext cx="11743" cy="4531608"/>
           </a:xfrm>
           <a:prstGeom prst="line">
@@ -3923,7 +3923,7 @@
         </p:nvSpPr>
         <p:spPr>
           <a:xfrm>
-            <a:off x="3703507" y="405072"/>
+            <a:off x="4602667" y="405072"/>
             <a:ext cx="1098600" cy="369332"/>
           </a:xfrm>
           <a:prstGeom prst="rect">
@@ -3961,7 +3961,7 @@
         </p:nvSpPr>
         <p:spPr>
           <a:xfrm>
-            <a:off x="3721675" y="1702131"/>
+            <a:off x="4620835" y="1702131"/>
             <a:ext cx="1056201" cy="369332"/>
           </a:xfrm>
           <a:prstGeom prst="rect">
@@ -3999,7 +3999,7 @@
         </p:nvSpPr>
         <p:spPr>
           <a:xfrm>
-            <a:off x="4026226" y="2335429"/>
+            <a:off x="4925386" y="2335429"/>
             <a:ext cx="441055" cy="369332"/>
           </a:xfrm>
           <a:prstGeom prst="rect">
@@ -4037,7 +4037,7 @@
         </p:nvSpPr>
         <p:spPr>
           <a:xfrm>
-            <a:off x="4026226" y="2889999"/>
+            <a:off x="4925386" y="2889999"/>
             <a:ext cx="441055" cy="369332"/>
           </a:xfrm>
           <a:prstGeom prst="rect">
@@ -4075,7 +4075,7 @@
         </p:nvSpPr>
         <p:spPr>
           <a:xfrm>
-            <a:off x="3674987" y="3444569"/>
+            <a:off x="4574147" y="3444569"/>
             <a:ext cx="1151337" cy="369332"/>
           </a:xfrm>
           <a:prstGeom prst="rect">
@@ -4113,7 +4113,7 @@
         </p:nvSpPr>
         <p:spPr>
           <a:xfrm>
-            <a:off x="4026226" y="4077723"/>
+            <a:off x="4925386" y="4077723"/>
             <a:ext cx="441055" cy="369332"/>
           </a:xfrm>
           <a:prstGeom prst="rect">
@@ -4151,7 +4151,7 @@
         </p:nvSpPr>
         <p:spPr>
           <a:xfrm>
-            <a:off x="3749379" y="4678473"/>
+            <a:off x="4648539" y="4678473"/>
             <a:ext cx="1010796" cy="369332"/>
           </a:xfrm>
           <a:prstGeom prst="rect">
@@ -4191,7 +4191,7 @@
         </p:nvCxnSpPr>
         <p:spPr>
           <a:xfrm>
-            <a:off x="4235931" y="3927146"/>
+            <a:off x="5135091" y="3927146"/>
             <a:ext cx="1525835" cy="707507"/>
           </a:xfrm>
           <a:prstGeom prst="bentConnector3">
@@ -4234,7 +4234,7 @@
         </p:nvSpPr>
         <p:spPr>
           <a:xfrm>
-            <a:off x="5027770" y="4471422"/>
+            <a:off x="5926930" y="4471422"/>
             <a:ext cx="441055" cy="369332"/>
           </a:xfrm>
           <a:prstGeom prst="rect">
@@ -4272,7 +4272,7 @@
         </p:nvSpPr>
         <p:spPr>
           <a:xfrm>
-            <a:off x="5027770" y="5057448"/>
+            <a:off x="5926930" y="5057448"/>
             <a:ext cx="441055" cy="369332"/>
           </a:xfrm>
           <a:prstGeom prst="rect">
@@ -4310,7 +4310,7 @@
         </p:nvSpPr>
         <p:spPr>
           <a:xfrm>
-            <a:off x="5953446" y="4471422"/>
+            <a:off x="6852606" y="4471422"/>
             <a:ext cx="441055" cy="369332"/>
           </a:xfrm>
           <a:prstGeom prst="rect">
@@ -4348,7 +4348,7 @@
         </p:nvSpPr>
         <p:spPr>
           <a:xfrm>
-            <a:off x="5497744" y="4471422"/>
+            <a:off x="6396904" y="4471422"/>
             <a:ext cx="441055" cy="369332"/>
           </a:xfrm>
           <a:prstGeom prst="rect">
@@ -4386,7 +4386,7 @@
         </p:nvSpPr>
         <p:spPr>
           <a:xfrm>
-            <a:off x="5839122" y="1851831"/>
+            <a:off x="6738282" y="1851831"/>
             <a:ext cx="780424" cy="369332"/>
           </a:xfrm>
           <a:prstGeom prst="rect">
@@ -4424,7 +4424,7 @@
         </p:nvSpPr>
         <p:spPr>
           <a:xfrm>
-            <a:off x="5951544" y="2456158"/>
+            <a:off x="6850704" y="2456158"/>
             <a:ext cx="555581" cy="369332"/>
           </a:xfrm>
           <a:prstGeom prst="rect">
@@ -4462,7 +4462,7 @@
         </p:nvSpPr>
         <p:spPr>
           <a:xfrm>
-            <a:off x="4477646" y="2394067"/>
+            <a:off x="5376806" y="2394067"/>
             <a:ext cx="1056201" cy="369332"/>
           </a:xfrm>
           <a:prstGeom prst="rect">
@@ -4502,7 +4502,7 @@
         </p:nvCxnSpPr>
         <p:spPr>
           <a:xfrm>
-            <a:off x="4246753" y="2202995"/>
+            <a:off x="5145913" y="2202995"/>
             <a:ext cx="758994" cy="221352"/>
           </a:xfrm>
           <a:prstGeom prst="bentConnector2">
@@ -4543,7 +4543,7 @@
         </p:nvSpPr>
         <p:spPr>
           <a:xfrm>
-            <a:off x="5341828" y="4824580"/>
+            <a:off x="6240988" y="4824580"/>
             <a:ext cx="1116605" cy="338554"/>
           </a:xfrm>
           <a:prstGeom prst="rect">
@@ -4588,7 +4588,7 @@
         </p:nvSpPr>
         <p:spPr>
           <a:xfrm>
-            <a:off x="6280225" y="1682554"/>
+            <a:off x="7179385" y="1682554"/>
             <a:ext cx="1116605" cy="338554"/>
           </a:xfrm>
           <a:prstGeom prst="rect">
@@ -4633,7 +4633,7 @@
         </p:nvSpPr>
         <p:spPr>
           <a:xfrm>
-            <a:off x="3154991" y="5527679"/>
+            <a:off x="4054151" y="5527679"/>
             <a:ext cx="1018075" cy="369332"/>
           </a:xfrm>
           <a:prstGeom prst="rect">
@@ -4673,7 +4673,7 @@
         </p:nvCxnSpPr>
         <p:spPr>
           <a:xfrm rot="5400000" flipH="1" flipV="1">
-            <a:off x="4120056" y="4849985"/>
+            <a:off x="5019216" y="4849985"/>
             <a:ext cx="250241" cy="1162295"/>
           </a:xfrm>
           <a:prstGeom prst="bentConnector2">
@@ -4714,7 +4714,7 @@
         </p:nvGrpSpPr>
         <p:grpSpPr>
           <a:xfrm>
-            <a:off x="4617520" y="5298868"/>
+            <a:off x="5516680" y="5298868"/>
             <a:ext cx="441055" cy="593033"/>
             <a:chOff x="4617520" y="5163132"/>
             <a:chExt cx="441055" cy="593033"/>
@@ -4816,7 +4816,7 @@
         </p:nvSpPr>
         <p:spPr>
           <a:xfrm>
-            <a:off x="2547937" y="4217537"/>
+            <a:off x="3447097" y="4217537"/>
             <a:ext cx="1563035" cy="584775"/>
           </a:xfrm>
           <a:prstGeom prst="rect">
@@ -4861,7 +4861,7 @@
         </p:nvSpPr>
         <p:spPr>
           <a:xfrm>
-            <a:off x="4679380" y="438361"/>
+            <a:off x="5578540" y="438361"/>
             <a:ext cx="2272840" cy="338554"/>
           </a:xfrm>
           <a:prstGeom prst="rect">
@@ -4906,7 +4906,7 @@
         </p:nvSpPr>
         <p:spPr>
           <a:xfrm>
-            <a:off x="3947290" y="975487"/>
+            <a:off x="4846450" y="975487"/>
             <a:ext cx="530356" cy="369332"/>
           </a:xfrm>
           <a:prstGeom prst="rect">
@@ -4944,7 +4944,7 @@
         </p:nvSpPr>
         <p:spPr>
           <a:xfrm>
-            <a:off x="4419303" y="986195"/>
+            <a:off x="5318463" y="986195"/>
             <a:ext cx="1555559" cy="338554"/>
           </a:xfrm>
           <a:prstGeom prst="rect">
@@ -4989,7 +4989,7 @@
         </p:nvSpPr>
         <p:spPr>
           <a:xfrm>
-            <a:off x="4724040" y="1787961"/>
+            <a:off x="5623200" y="1787961"/>
             <a:ext cx="1050474" cy="338554"/>
           </a:xfrm>
           <a:prstGeom prst="rect">
@@ -5034,7 +5034,7 @@
         </p:nvSpPr>
         <p:spPr>
           <a:xfrm>
-            <a:off x="3341691" y="2356037"/>
+            <a:off x="4240851" y="2356037"/>
             <a:ext cx="886815" cy="338554"/>
           </a:xfrm>
           <a:prstGeom prst="rect">
@@ -5079,7 +5079,7 @@
         </p:nvSpPr>
         <p:spPr>
           <a:xfrm>
-            <a:off x="4598214" y="2993350"/>
+            <a:off x="5497374" y="2993350"/>
             <a:ext cx="1116605" cy="369332"/>
           </a:xfrm>
           <a:prstGeom prst="rect">
@@ -5124,7 +5124,7 @@
         </p:nvSpPr>
         <p:spPr>
           <a:xfrm>
-            <a:off x="2741003" y="865506"/>
+            <a:off x="3640163" y="865506"/>
             <a:ext cx="1229097" cy="707886"/>
           </a:xfrm>
           <a:prstGeom prst="rect">

</xml_diff>